<commit_message>
PPTx updated with author photos
</commit_message>
<xml_diff>
--- a/_resources/book/HumanElementCover.pptx
+++ b/_resources/book/HumanElementCover.pptx
@@ -6,6 +6,7 @@
   </p:sldMasterIdLst>
   <p:sldIdLst>
     <p:sldId id="256" r:id="rId2"/>
+    <p:sldId id="257" r:id="rId3"/>
   </p:sldIdLst>
   <p:sldSz cx="5486400" cy="8229600"/>
   <p:notesSz cx="6858000" cy="9144000"/>
@@ -104,6 +105,11 @@
       </a:defRPr>
     </a:lvl9pPr>
   </p:defaultTextStyle>
+  <p:extLst>
+    <p:ext uri="{EFAFB233-063F-42B5-8137-9DF3F51BA10A}">
+      <p15:sldGuideLst xmlns:p15="http://schemas.microsoft.com/office/powerpoint/2012/main"/>
+    </p:ext>
+  </p:extLst>
 </p:presentation>
 </file>
 
@@ -238,7 +244,7 @@
           <a:p>
             <a:fld id="{BDD7216A-3E42-1E41-A210-5E9CAC5F4787}" type="datetimeFigureOut">
               <a:rPr lang="en-US" smtClean="0"/>
-              <a:t>1/11/25</a:t>
+              <a:t>1/13/25</a:t>
             </a:fld>
             <a:endParaRPr lang="en-US"/>
           </a:p>
@@ -408,7 +414,7 @@
           <a:p>
             <a:fld id="{BDD7216A-3E42-1E41-A210-5E9CAC5F4787}" type="datetimeFigureOut">
               <a:rPr lang="en-US" smtClean="0"/>
-              <a:t>1/11/25</a:t>
+              <a:t>1/13/25</a:t>
             </a:fld>
             <a:endParaRPr lang="en-US"/>
           </a:p>
@@ -588,7 +594,7 @@
           <a:p>
             <a:fld id="{BDD7216A-3E42-1E41-A210-5E9CAC5F4787}" type="datetimeFigureOut">
               <a:rPr lang="en-US" smtClean="0"/>
-              <a:t>1/11/25</a:t>
+              <a:t>1/13/25</a:t>
             </a:fld>
             <a:endParaRPr lang="en-US"/>
           </a:p>
@@ -758,7 +764,7 @@
           <a:p>
             <a:fld id="{BDD7216A-3E42-1E41-A210-5E9CAC5F4787}" type="datetimeFigureOut">
               <a:rPr lang="en-US" smtClean="0"/>
-              <a:t>1/11/25</a:t>
+              <a:t>1/13/25</a:t>
             </a:fld>
             <a:endParaRPr lang="en-US"/>
           </a:p>
@@ -1004,7 +1010,7 @@
           <a:p>
             <a:fld id="{BDD7216A-3E42-1E41-A210-5E9CAC5F4787}" type="datetimeFigureOut">
               <a:rPr lang="en-US" smtClean="0"/>
-              <a:t>1/11/25</a:t>
+              <a:t>1/13/25</a:t>
             </a:fld>
             <a:endParaRPr lang="en-US"/>
           </a:p>
@@ -1236,7 +1242,7 @@
           <a:p>
             <a:fld id="{BDD7216A-3E42-1E41-A210-5E9CAC5F4787}" type="datetimeFigureOut">
               <a:rPr lang="en-US" smtClean="0"/>
-              <a:t>1/11/25</a:t>
+              <a:t>1/13/25</a:t>
             </a:fld>
             <a:endParaRPr lang="en-US"/>
           </a:p>
@@ -1603,7 +1609,7 @@
           <a:p>
             <a:fld id="{BDD7216A-3E42-1E41-A210-5E9CAC5F4787}" type="datetimeFigureOut">
               <a:rPr lang="en-US" smtClean="0"/>
-              <a:t>1/11/25</a:t>
+              <a:t>1/13/25</a:t>
             </a:fld>
             <a:endParaRPr lang="en-US"/>
           </a:p>
@@ -1721,7 +1727,7 @@
           <a:p>
             <a:fld id="{BDD7216A-3E42-1E41-A210-5E9CAC5F4787}" type="datetimeFigureOut">
               <a:rPr lang="en-US" smtClean="0"/>
-              <a:t>1/11/25</a:t>
+              <a:t>1/13/25</a:t>
             </a:fld>
             <a:endParaRPr lang="en-US"/>
           </a:p>
@@ -1816,7 +1822,7 @@
           <a:p>
             <a:fld id="{BDD7216A-3E42-1E41-A210-5E9CAC5F4787}" type="datetimeFigureOut">
               <a:rPr lang="en-US" smtClean="0"/>
-              <a:t>1/11/25</a:t>
+              <a:t>1/13/25</a:t>
             </a:fld>
             <a:endParaRPr lang="en-US"/>
           </a:p>
@@ -2093,7 +2099,7 @@
           <a:p>
             <a:fld id="{BDD7216A-3E42-1E41-A210-5E9CAC5F4787}" type="datetimeFigureOut">
               <a:rPr lang="en-US" smtClean="0"/>
-              <a:t>1/11/25</a:t>
+              <a:t>1/13/25</a:t>
             </a:fld>
             <a:endParaRPr lang="en-US"/>
           </a:p>
@@ -2350,7 +2356,7 @@
           <a:p>
             <a:fld id="{BDD7216A-3E42-1E41-A210-5E9CAC5F4787}" type="datetimeFigureOut">
               <a:rPr lang="en-US" smtClean="0"/>
-              <a:t>1/11/25</a:t>
+              <a:t>1/13/25</a:t>
             </a:fld>
             <a:endParaRPr lang="en-US"/>
           </a:p>
@@ -2563,7 +2569,7 @@
           <a:p>
             <a:fld id="{BDD7216A-3E42-1E41-A210-5E9CAC5F4787}" type="datetimeFigureOut">
               <a:rPr lang="en-US" smtClean="0"/>
-              <a:t>1/11/25</a:t>
+              <a:t>1/13/25</a:t>
             </a:fld>
             <a:endParaRPr lang="en-US"/>
           </a:p>
@@ -3148,6 +3154,113 @@
 </p:sld>
 </file>
 
+<file path=ppt/slides/slide2.xml><?xml version="1.0" encoding="utf-8"?>
+<p:sld xmlns:a="http://schemas.openxmlformats.org/drawingml/2006/main" xmlns:r="http://schemas.openxmlformats.org/officeDocument/2006/relationships" xmlns:p="http://schemas.openxmlformats.org/presentationml/2006/main">
+  <p:cSld>
+    <p:spTree>
+      <p:nvGrpSpPr>
+        <p:cNvPr id="1" name=""/>
+        <p:cNvGrpSpPr/>
+        <p:nvPr/>
+      </p:nvGrpSpPr>
+      <p:grpSpPr>
+        <a:xfrm>
+          <a:off x="0" y="0"/>
+          <a:ext cx="0" cy="0"/>
+          <a:chOff x="0" y="0"/>
+          <a:chExt cx="0" cy="0"/>
+        </a:xfrm>
+      </p:grpSpPr>
+      <p:pic>
+        <p:nvPicPr>
+          <p:cNvPr id="1026" name="Picture 2">
+            <a:extLst>
+              <a:ext uri="{FF2B5EF4-FFF2-40B4-BE49-F238E27FC236}">
+                <a16:creationId xmlns:a16="http://schemas.microsoft.com/office/drawing/2014/main" id="{5DE269D6-5AEA-8323-6E78-E81C0AAF6498}"/>
+              </a:ext>
+            </a:extLst>
+          </p:cNvPr>
+          <p:cNvPicPr>
+            <a:picLocks noChangeAspect="1" noChangeArrowheads="1"/>
+          </p:cNvPicPr>
+          <p:nvPr/>
+        </p:nvPicPr>
+        <p:blipFill>
+          <a:blip r:embed="rId2">
+            <a:extLst>
+              <a:ext uri="{28A0092B-C50C-407E-A947-70E740481C1C}">
+                <a14:useLocalDpi xmlns:a14="http://schemas.microsoft.com/office/drawing/2010/main" val="0"/>
+              </a:ext>
+            </a:extLst>
+          </a:blip>
+          <a:srcRect/>
+          <a:stretch>
+            <a:fillRect/>
+          </a:stretch>
+        </p:blipFill>
+        <p:spPr bwMode="auto">
+          <a:xfrm>
+            <a:off x="35217" y="2571750"/>
+            <a:ext cx="2360763" cy="2413274"/>
+          </a:xfrm>
+          <a:prstGeom prst="rect">
+            <a:avLst/>
+          </a:prstGeom>
+          <a:noFill/>
+          <a:extLst>
+            <a:ext uri="{909E8E84-426E-40DD-AFC4-6F175D3DCCD1}">
+              <a14:hiddenFill xmlns:a14="http://schemas.microsoft.com/office/drawing/2010/main">
+                <a:solidFill>
+                  <a:srgbClr val="FFFFFF"/>
+                </a:solidFill>
+              </a14:hiddenFill>
+            </a:ext>
+          </a:extLst>
+        </p:spPr>
+      </p:pic>
+      <p:pic>
+        <p:nvPicPr>
+          <p:cNvPr id="5" name="Picture 4" descr="A person smiling in front of a city&#10;&#10;Description automatically generated">
+            <a:extLst>
+              <a:ext uri="{FF2B5EF4-FFF2-40B4-BE49-F238E27FC236}">
+                <a16:creationId xmlns:a16="http://schemas.microsoft.com/office/drawing/2014/main" id="{67215A89-CBE3-AFEB-4B12-6D9D6FCA8819}"/>
+              </a:ext>
+            </a:extLst>
+          </p:cNvPr>
+          <p:cNvPicPr>
+            <a:picLocks noChangeAspect="1"/>
+          </p:cNvPicPr>
+          <p:nvPr/>
+        </p:nvPicPr>
+        <p:blipFill>
+          <a:blip r:embed="rId3"/>
+          <a:stretch>
+            <a:fillRect/>
+          </a:stretch>
+        </p:blipFill>
+        <p:spPr>
+          <a:xfrm>
+            <a:off x="2395980" y="2571750"/>
+            <a:ext cx="2057400" cy="3086100"/>
+          </a:xfrm>
+          <a:prstGeom prst="rect">
+            <a:avLst/>
+          </a:prstGeom>
+        </p:spPr>
+      </p:pic>
+    </p:spTree>
+    <p:extLst>
+      <p:ext uri="{BB962C8B-B14F-4D97-AF65-F5344CB8AC3E}">
+        <p14:creationId xmlns:p14="http://schemas.microsoft.com/office/powerpoint/2010/main" val="626825696"/>
+      </p:ext>
+    </p:extLst>
+  </p:cSld>
+  <p:clrMapOvr>
+    <a:masterClrMapping/>
+  </p:clrMapOvr>
+</p:sld>
+</file>
+
 <file path=ppt/theme/theme1.xml><?xml version="1.0" encoding="utf-8"?>
 <a:theme xmlns:a="http://schemas.openxmlformats.org/drawingml/2006/main" name="Office Theme">
   <a:themeElements>

</xml_diff>

<commit_message>
Title change and misc edits to replace "element" with "exception"
</commit_message>
<xml_diff>
--- a/_resources/book/HumanElementCover.pptx
+++ b/_resources/book/HumanElementCover.pptx
@@ -244,7 +244,7 @@
           <a:p>
             <a:fld id="{BDD7216A-3E42-1E41-A210-5E9CAC5F4787}" type="datetimeFigureOut">
               <a:rPr lang="en-US" smtClean="0"/>
-              <a:t>1/13/25</a:t>
+              <a:t>4/10/25</a:t>
             </a:fld>
             <a:endParaRPr lang="en-US"/>
           </a:p>
@@ -414,7 +414,7 @@
           <a:p>
             <a:fld id="{BDD7216A-3E42-1E41-A210-5E9CAC5F4787}" type="datetimeFigureOut">
               <a:rPr lang="en-US" smtClean="0"/>
-              <a:t>1/13/25</a:t>
+              <a:t>4/10/25</a:t>
             </a:fld>
             <a:endParaRPr lang="en-US"/>
           </a:p>
@@ -594,7 +594,7 @@
           <a:p>
             <a:fld id="{BDD7216A-3E42-1E41-A210-5E9CAC5F4787}" type="datetimeFigureOut">
               <a:rPr lang="en-US" smtClean="0"/>
-              <a:t>1/13/25</a:t>
+              <a:t>4/10/25</a:t>
             </a:fld>
             <a:endParaRPr lang="en-US"/>
           </a:p>
@@ -764,7 +764,7 @@
           <a:p>
             <a:fld id="{BDD7216A-3E42-1E41-A210-5E9CAC5F4787}" type="datetimeFigureOut">
               <a:rPr lang="en-US" smtClean="0"/>
-              <a:t>1/13/25</a:t>
+              <a:t>4/10/25</a:t>
             </a:fld>
             <a:endParaRPr lang="en-US"/>
           </a:p>
@@ -1010,7 +1010,7 @@
           <a:p>
             <a:fld id="{BDD7216A-3E42-1E41-A210-5E9CAC5F4787}" type="datetimeFigureOut">
               <a:rPr lang="en-US" smtClean="0"/>
-              <a:t>1/13/25</a:t>
+              <a:t>4/10/25</a:t>
             </a:fld>
             <a:endParaRPr lang="en-US"/>
           </a:p>
@@ -1242,7 +1242,7 @@
           <a:p>
             <a:fld id="{BDD7216A-3E42-1E41-A210-5E9CAC5F4787}" type="datetimeFigureOut">
               <a:rPr lang="en-US" smtClean="0"/>
-              <a:t>1/13/25</a:t>
+              <a:t>4/10/25</a:t>
             </a:fld>
             <a:endParaRPr lang="en-US"/>
           </a:p>
@@ -1609,7 +1609,7 @@
           <a:p>
             <a:fld id="{BDD7216A-3E42-1E41-A210-5E9CAC5F4787}" type="datetimeFigureOut">
               <a:rPr lang="en-US" smtClean="0"/>
-              <a:t>1/13/25</a:t>
+              <a:t>4/10/25</a:t>
             </a:fld>
             <a:endParaRPr lang="en-US"/>
           </a:p>
@@ -1727,7 +1727,7 @@
           <a:p>
             <a:fld id="{BDD7216A-3E42-1E41-A210-5E9CAC5F4787}" type="datetimeFigureOut">
               <a:rPr lang="en-US" smtClean="0"/>
-              <a:t>1/13/25</a:t>
+              <a:t>4/10/25</a:t>
             </a:fld>
             <a:endParaRPr lang="en-US"/>
           </a:p>
@@ -1822,7 +1822,7 @@
           <a:p>
             <a:fld id="{BDD7216A-3E42-1E41-A210-5E9CAC5F4787}" type="datetimeFigureOut">
               <a:rPr lang="en-US" smtClean="0"/>
-              <a:t>1/13/25</a:t>
+              <a:t>4/10/25</a:t>
             </a:fld>
             <a:endParaRPr lang="en-US"/>
           </a:p>
@@ -2099,7 +2099,7 @@
           <a:p>
             <a:fld id="{BDD7216A-3E42-1E41-A210-5E9CAC5F4787}" type="datetimeFigureOut">
               <a:rPr lang="en-US" smtClean="0"/>
-              <a:t>1/13/25</a:t>
+              <a:t>4/10/25</a:t>
             </a:fld>
             <a:endParaRPr lang="en-US"/>
           </a:p>
@@ -2356,7 +2356,7 @@
           <a:p>
             <a:fld id="{BDD7216A-3E42-1E41-A210-5E9CAC5F4787}" type="datetimeFigureOut">
               <a:rPr lang="en-US" smtClean="0"/>
-              <a:t>1/13/25</a:t>
+              <a:t>4/10/25</a:t>
             </a:fld>
             <a:endParaRPr lang="en-US"/>
           </a:p>
@@ -2569,7 +2569,7 @@
           <a:p>
             <a:fld id="{BDD7216A-3E42-1E41-A210-5E9CAC5F4787}" type="datetimeFigureOut">
               <a:rPr lang="en-US" smtClean="0"/>
-              <a:t>1/13/25</a:t>
+              <a:t>4/10/25</a:t>
             </a:fld>
             <a:endParaRPr lang="en-US"/>
           </a:p>
@@ -3041,7 +3041,7 @@
                 </a:solidFill>
                 <a:latin typeface="Skia" panose="020D0502020204020204" pitchFamily="34" charset="0"/>
               </a:rPr>
-              <a:t>The Human Element</a:t>
+              <a:t>The Human Exception</a:t>
             </a:r>
           </a:p>
         </p:txBody>
@@ -3083,7 +3083,7 @@
                 </a:solidFill>
                 <a:latin typeface="Skia" panose="020D0502020204020204" pitchFamily="34" charset="0"/>
               </a:rPr>
-              <a:t>Sami J Karam</a:t>
+              <a:t>Sami J. Karam</a:t>
             </a:r>
           </a:p>
           <a:p>
@@ -3094,7 +3094,7 @@
                 </a:solidFill>
                 <a:latin typeface="Skia" panose="020D0502020204020204" pitchFamily="34" charset="0"/>
               </a:rPr>
-              <a:t>Richard Sprague</a:t>
+              <a:t>Richard A. Sprague</a:t>
             </a:r>
           </a:p>
         </p:txBody>

</xml_diff>